<commit_message>
Add helpful link to pptx.
</commit_message>
<xml_diff>
--- a/docs/tern.java_EclipseDay _16-10-15.pptx
+++ b/docs/tern.java_EclipseDay _16-10-15.pptx
@@ -5,7 +5,7 @@
     <p:sldMasterId id="2147483660" r:id="rId1"/>
   </p:sldMasterIdLst>
   <p:notesMasterIdLst>
-    <p:notesMasterId r:id="rId8"/>
+    <p:notesMasterId r:id="rId9"/>
   </p:notesMasterIdLst>
   <p:sldIdLst>
     <p:sldId id="258" r:id="rId2"/>
@@ -14,6 +14,7 @@
     <p:sldId id="300" r:id="rId5"/>
     <p:sldId id="301" r:id="rId6"/>
     <p:sldId id="288" r:id="rId7"/>
+    <p:sldId id="302" r:id="rId8"/>
   </p:sldIdLst>
   <p:sldSz cx="9144000" cy="5143500" type="screen16x9"/>
   <p:notesSz cx="6858000" cy="9144000"/>
@@ -114,7 +115,7 @@
   </p:defaultTextStyle>
   <p:extLst>
     <p:ext uri="{EFAFB233-063F-42B5-8137-9DF3F51BA10A}">
-      <p15:sldGuideLst xmlns="" xmlns:p15="http://schemas.microsoft.com/office/powerpoint/2012/main">
+      <p15:sldGuideLst xmlns:p15="http://schemas.microsoft.com/office/powerpoint/2012/main" xmlns="">
         <p15:guide id="1" orient="horz" pos="1620">
           <p15:clr>
             <a:srgbClr val="A4A3A4"/>
@@ -15921,15 +15922,7 @@
             </a:r>
             <a:r>
               <a:rPr lang="fr-FR" dirty="0" smtClean="0"/>
-              <a:t> </a:t>
-            </a:r>
-            <a:r>
-              <a:rPr lang="fr-FR" dirty="0" smtClean="0"/>
-              <a:t>: </a:t>
-            </a:r>
-            <a:r>
-              <a:rPr lang="fr-FR" dirty="0" smtClean="0"/>
-              <a:t>étend le plugin JavaScript </a:t>
+              <a:t> : étend le plugin JavaScript </a:t>
             </a:r>
             <a:r>
               <a:rPr lang="fr-FR" b="1" dirty="0" smtClean="0"/>
@@ -15960,8 +15953,29 @@
             </a:r>
             <a:r>
               <a:rPr lang="fr-FR" b="1" dirty="0" smtClean="0"/>
-              <a:t> validation</a:t>
-            </a:r>
+              <a:t> </a:t>
+            </a:r>
+            <a:r>
+              <a:rPr lang="fr-FR" b="1" dirty="0" smtClean="0"/>
+              <a:t>validation (</a:t>
+            </a:r>
+            <a:r>
+              <a:rPr lang="fr-FR" b="1" dirty="0" err="1" smtClean="0"/>
+              <a:t>JSHint</a:t>
+            </a:r>
+            <a:r>
+              <a:rPr lang="fr-FR" b="1" dirty="0" smtClean="0"/>
+              <a:t>, </a:t>
+            </a:r>
+            <a:r>
+              <a:rPr lang="fr-FR" b="1" dirty="0" err="1" smtClean="0"/>
+              <a:t>ESLint</a:t>
+            </a:r>
+            <a:r>
+              <a:rPr lang="fr-FR" b="1" dirty="0" smtClean="0"/>
+              <a:t>)</a:t>
+            </a:r>
+            <a:endParaRPr lang="fr-FR" b="1" dirty="0" smtClean="0"/>
           </a:p>
           <a:p>
             <a:pPr lvl="1"/>
@@ -16084,7 +16098,6 @@
               <a:rPr lang="fr-FR" b="1" dirty="0" smtClean="0"/>
               <a:t>Etc…</a:t>
             </a:r>
-            <a:endParaRPr lang="fr-FR" b="1" dirty="0" smtClean="0"/>
           </a:p>
           <a:p>
             <a:endParaRPr lang="fr-FR" dirty="0" smtClean="0"/>
@@ -16724,7 +16737,6 @@
               <a:rPr lang="fr-FR" dirty="0" smtClean="0"/>
               <a:t>)</a:t>
             </a:r>
-            <a:endParaRPr lang="fr-FR" dirty="0" smtClean="0"/>
           </a:p>
         </p:txBody>
       </p:sp>
@@ -17233,6 +17245,220 @@
     <p:extLst>
       <p:ext uri="{BB962C8B-B14F-4D97-AF65-F5344CB8AC3E}">
         <p14:creationId xmlns:p14="http://schemas.microsoft.com/office/powerpoint/2010/main" val="3272480073"/>
+      </p:ext>
+    </p:extLst>
+  </p:cSld>
+  <p:clrMapOvr>
+    <a:masterClrMapping/>
+  </p:clrMapOvr>
+  <mc:AlternateContent xmlns:mc="http://schemas.openxmlformats.org/markup-compatibility/2006" xmlns:p14="http://schemas.microsoft.com/office/powerpoint/2010/main">
+    <mc:Choice Requires="p14">
+      <p:transition spd="med" p14:dur="700">
+        <p:fade/>
+      </p:transition>
+    </mc:Choice>
+    <mc:Fallback xmlns="">
+      <p:transition spd="med">
+        <p:fade/>
+      </p:transition>
+    </mc:Fallback>
+  </mc:AlternateContent>
+</p:sld>
+</file>
+
+<file path=ppt/slides/slide7.xml><?xml version="1.0" encoding="utf-8"?>
+<p:sld xmlns:a="http://schemas.openxmlformats.org/drawingml/2006/main" xmlns:r="http://schemas.openxmlformats.org/officeDocument/2006/relationships" xmlns:p="http://schemas.openxmlformats.org/presentationml/2006/main">
+  <p:cSld>
+    <p:spTree>
+      <p:nvGrpSpPr>
+        <p:cNvPr id="1" name=""/>
+        <p:cNvGrpSpPr/>
+        <p:nvPr/>
+      </p:nvGrpSpPr>
+      <p:grpSpPr>
+        <a:xfrm>
+          <a:off x="0" y="0"/>
+          <a:ext cx="0" cy="0"/>
+          <a:chOff x="0" y="0"/>
+          <a:chExt cx="0" cy="0"/>
+        </a:xfrm>
+      </p:grpSpPr>
+      <p:sp>
+        <p:nvSpPr>
+          <p:cNvPr id="2" name="Titre 1"/>
+          <p:cNvSpPr>
+            <a:spLocks noGrp="1"/>
+          </p:cNvSpPr>
+          <p:nvPr>
+            <p:ph type="title"/>
+          </p:nvPr>
+        </p:nvSpPr>
+        <p:spPr/>
+        <p:txBody>
+          <a:bodyPr/>
+          <a:lstStyle/>
+          <a:p>
+            <a:r>
+              <a:rPr lang="fr-FR" dirty="0" smtClean="0"/>
+              <a:t>Liens utiles</a:t>
+            </a:r>
+            <a:endParaRPr lang="fr-FR" dirty="0"/>
+          </a:p>
+        </p:txBody>
+      </p:sp>
+      <p:sp>
+        <p:nvSpPr>
+          <p:cNvPr id="3" name="Espace réservé du contenu 2"/>
+          <p:cNvSpPr>
+            <a:spLocks noGrp="1"/>
+          </p:cNvSpPr>
+          <p:nvPr>
+            <p:ph sz="half" idx="1"/>
+          </p:nvPr>
+        </p:nvSpPr>
+        <p:spPr>
+          <a:xfrm>
+            <a:off x="251520" y="843558"/>
+            <a:ext cx="8712968" cy="3750667"/>
+          </a:xfrm>
+        </p:spPr>
+        <p:txBody>
+          <a:bodyPr>
+            <a:normAutofit/>
+          </a:bodyPr>
+          <a:lstStyle/>
+          <a:p>
+            <a:r>
+              <a:rPr lang="fr-FR" dirty="0"/>
+              <a:t>Pour commencer avec </a:t>
+            </a:r>
+            <a:endParaRPr lang="fr-FR" dirty="0" smtClean="0"/>
+          </a:p>
+          <a:p>
+            <a:pPr lvl="1"/>
+            <a:r>
+              <a:rPr lang="fr-FR" b="1" dirty="0" smtClean="0"/>
+              <a:t>tern.java</a:t>
+            </a:r>
+            <a:r>
+              <a:rPr lang="fr-FR" dirty="0" smtClean="0"/>
+              <a:t> </a:t>
+            </a:r>
+            <a:r>
+              <a:rPr lang="fr-FR" dirty="0" smtClean="0">
+                <a:hlinkClick r:id="rId2"/>
+              </a:rPr>
+              <a:t>https</a:t>
+            </a:r>
+            <a:r>
+              <a:rPr lang="fr-FR" dirty="0">
+                <a:hlinkClick r:id="rId2"/>
+              </a:rPr>
+              <a:t>://</a:t>
+            </a:r>
+            <a:r>
+              <a:rPr lang="fr-FR" dirty="0" smtClean="0">
+                <a:hlinkClick r:id="rId2"/>
+              </a:rPr>
+              <a:t>github.com/angelozerr/tern.java/wiki/Getting-Started</a:t>
+            </a:r>
+            <a:endParaRPr lang="fr-FR" dirty="0" smtClean="0"/>
+          </a:p>
+          <a:p>
+            <a:pPr lvl="1"/>
+            <a:r>
+              <a:rPr lang="fr-FR" b="1" dirty="0" err="1" smtClean="0"/>
+              <a:t>AngularJS</a:t>
+            </a:r>
+            <a:r>
+              <a:rPr lang="fr-FR" b="1" dirty="0"/>
+              <a:t> Eclipse</a:t>
+            </a:r>
+            <a:r>
+              <a:rPr lang="fr-FR" dirty="0"/>
+              <a:t> </a:t>
+            </a:r>
+            <a:r>
+              <a:rPr lang="fr-FR" dirty="0">
+                <a:hlinkClick r:id="rId3"/>
+              </a:rPr>
+              <a:t>https://</a:t>
+            </a:r>
+            <a:r>
+              <a:rPr lang="fr-FR" dirty="0" smtClean="0">
+                <a:hlinkClick r:id="rId3"/>
+              </a:rPr>
+              <a:t>github.com/angelozerr/angularjs-eclipse/wiki/Getting-Started</a:t>
+            </a:r>
+            <a:endParaRPr lang="fr-FR" dirty="0" smtClean="0"/>
+          </a:p>
+          <a:p>
+            <a:pPr lvl="1"/>
+            <a:r>
+              <a:rPr lang="fr-FR" b="1" dirty="0" err="1" smtClean="0"/>
+              <a:t>JSBuild</a:t>
+            </a:r>
+            <a:r>
+              <a:rPr lang="fr-FR" b="1" dirty="0" smtClean="0"/>
+              <a:t> Eclipse</a:t>
+            </a:r>
+            <a:r>
+              <a:rPr lang="fr-FR" dirty="0"/>
+              <a:t> </a:t>
+            </a:r>
+            <a:r>
+              <a:rPr lang="fr-FR" dirty="0">
+                <a:hlinkClick r:id="rId4"/>
+              </a:rPr>
+              <a:t>https://</a:t>
+            </a:r>
+            <a:r>
+              <a:rPr lang="fr-FR" dirty="0" smtClean="0">
+                <a:hlinkClick r:id="rId4"/>
+              </a:rPr>
+              <a:t>github.com/angelozerr/jsbuild-eclipse/wiki/Getting-Started</a:t>
+            </a:r>
+            <a:endParaRPr lang="fr-FR" dirty="0" smtClean="0"/>
+          </a:p>
+          <a:p>
+            <a:pPr lvl="1"/>
+            <a:endParaRPr lang="fr-FR" dirty="0" smtClean="0"/>
+          </a:p>
+          <a:p>
+            <a:endParaRPr lang="fr-FR" dirty="0" smtClean="0"/>
+          </a:p>
+          <a:p>
+            <a:endParaRPr lang="fr-FR" sz="1600" dirty="0" smtClean="0"/>
+          </a:p>
+        </p:txBody>
+      </p:sp>
+      <p:sp>
+        <p:nvSpPr>
+          <p:cNvPr id="8" name="Espace réservé du numéro de diapositive 7"/>
+          <p:cNvSpPr>
+            <a:spLocks noGrp="1"/>
+          </p:cNvSpPr>
+          <p:nvPr>
+            <p:ph type="sldNum" sz="quarter" idx="12"/>
+          </p:nvPr>
+        </p:nvSpPr>
+        <p:spPr/>
+        <p:txBody>
+          <a:bodyPr/>
+          <a:lstStyle/>
+          <a:p>
+            <a:fld id="{31983D30-6903-4279-B3B7-192429037A18}" type="slidenum">
+              <a:rPr lang="fr-FR" smtClean="0"/>
+              <a:t>7</a:t>
+            </a:fld>
+            <a:endParaRPr lang="fr-FR"/>
+          </a:p>
+        </p:txBody>
+      </p:sp>
+    </p:spTree>
+    <p:extLst>
+      <p:ext uri="{BB962C8B-B14F-4D97-AF65-F5344CB8AC3E}">
+        <p14:creationId xmlns:p14="http://schemas.microsoft.com/office/powerpoint/2010/main" val="3167606019"/>
       </p:ext>
     </p:extLst>
   </p:cSld>

</xml_diff>